<commit_message>
Minor changes to powerpoint
</commit_message>
<xml_diff>
--- a/Practical examples of accelerating numerical and ML research.pptx
+++ b/Practical examples of accelerating numerical and ML research.pptx
@@ -12967,7 +12967,7 @@
         <p:spPr>
           <a:xfrm>
             <a:off x="484552" y="365125"/>
-            <a:ext cx="5022630" cy="2430030"/>
+            <a:ext cx="5438728" cy="2430030"/>
           </a:xfrm>
         </p:spPr>
         <p:txBody>
@@ -12982,8 +12982,8 @@
               </a:lnSpc>
             </a:pPr>
             <a:r>
-              <a:rPr lang="en-GB" sz="5000" dirty="0"/>
-              <a:t>Example Problem – Random Walk</a:t>
+              <a:rPr lang="en-GB" sz="4400" dirty="0"/>
+              <a:t>Example Problem – Monte Carlo Simulation</a:t>
             </a:r>
           </a:p>
         </p:txBody>
@@ -13034,7 +13034,7 @@
                 </a:pPr>
                 <a:r>
                   <a:rPr lang="en-US" dirty="0"/>
-                  <a:t>We want to get </a:t>
+                  <a:t>We want to generate </a:t>
                 </a:r>
                 <a14:m>
                   <m:oMath xmlns:m="http://schemas.openxmlformats.org/officeDocument/2006/math">
@@ -13072,7 +13072,7 @@
                 </a:pPr>
                 <a:r>
                   <a:rPr lang="en-GB" dirty="0"/>
-                  <a:t>Simple “embarrassingly parallel” problem, which is very common.</a:t>
+                  <a:t>Most Monte-Carlo simulations are “embarrassingly parallel”</a:t>
                 </a:r>
                 <a:endParaRPr lang="en-GB" b="0" dirty="0"/>
               </a:p>
@@ -13104,7 +13104,7 @@
               <a:blipFill>
                 <a:blip r:embed="rId2"/>
                 <a:stretch>
-                  <a:fillRect l="-1092"/>
+                  <a:fillRect l="-1092" r="-121" b="-1446"/>
                 </a:stretch>
               </a:blipFill>
             </p:spPr>
@@ -13817,7 +13817,7 @@
           <a:p>
             <a:r>
               <a:rPr lang="en-GB" dirty="0"/>
-              <a:t>Code Overview</a:t>
+              <a:t>Code Overview + speed</a:t>
             </a:r>
           </a:p>
         </p:txBody>
@@ -14049,10 +14049,10 @@
       </p:sp>
       <p:grpSp>
         <p:nvGrpSpPr>
-          <p:cNvPr id="10" name="Group 9">
-            <a:extLst>
-              <a:ext uri="{FF2B5EF4-FFF2-40B4-BE49-F238E27FC236}">
-                <a16:creationId xmlns:a16="http://schemas.microsoft.com/office/drawing/2014/main" id="{D9CE83F5-05D4-A0C6-6A58-FCF8CFF35978}"/>
+          <p:cNvPr id="35" name="Group 34">
+            <a:extLst>
+              <a:ext uri="{FF2B5EF4-FFF2-40B4-BE49-F238E27FC236}">
+                <a16:creationId xmlns:a16="http://schemas.microsoft.com/office/drawing/2014/main" id="{1629368A-DF72-1365-28EC-2896280AFB8D}"/>
               </a:ext>
             </a:extLst>
           </p:cNvPr>
@@ -14061,18 +14061,18 @@
         </p:nvGrpSpPr>
         <p:grpSpPr>
           <a:xfrm>
-            <a:off x="6980116" y="3333677"/>
-            <a:ext cx="4070504" cy="2025870"/>
-            <a:chOff x="1191958" y="2514600"/>
-            <a:chExt cx="4070504" cy="2025870"/>
+            <a:off x="6980116" y="3272855"/>
+            <a:ext cx="4070504" cy="905818"/>
+            <a:chOff x="6980116" y="3333677"/>
+            <a:chExt cx="4070504" cy="905818"/>
           </a:xfrm>
         </p:grpSpPr>
         <p:pic>
           <p:nvPicPr>
-            <p:cNvPr id="5" name="Picture 4">
+            <p:cNvPr id="24" name="Picture 23">
               <a:extLst>
                 <a:ext uri="{FF2B5EF4-FFF2-40B4-BE49-F238E27FC236}">
-                  <a16:creationId xmlns:a16="http://schemas.microsoft.com/office/drawing/2014/main" id="{D86343B7-6B23-BAB6-1057-24C6E601F0AC}"/>
+                  <a16:creationId xmlns:a16="http://schemas.microsoft.com/office/drawing/2014/main" id="{B7352398-A2B8-928A-5E1E-E5330EE4406E}"/>
                 </a:ext>
               </a:extLst>
             </p:cNvPr>
@@ -14083,71 +14083,206 @@
           </p:nvPicPr>
           <p:blipFill rotWithShape="1">
             <a:blip r:embed="rId3"/>
-            <a:srcRect b="2567"/>
+            <a:srcRect t="23209" b="62922"/>
             <a:stretch/>
           </p:blipFill>
           <p:spPr>
             <a:xfrm>
-              <a:off x="1191958" y="2514600"/>
-              <a:ext cx="4070504" cy="2025870"/>
+              <a:off x="6980116" y="3333677"/>
+              <a:ext cx="4070504" cy="288363"/>
             </a:xfrm>
             <a:prstGeom prst="rect">
               <a:avLst/>
             </a:prstGeom>
           </p:spPr>
         </p:pic>
-        <p:sp>
-          <p:nvSpPr>
-            <p:cNvPr id="9" name="Rectangle: Rounded Corners 8">
+        <p:pic>
+          <p:nvPicPr>
+            <p:cNvPr id="26" name="Picture 25">
               <a:extLst>
                 <a:ext uri="{FF2B5EF4-FFF2-40B4-BE49-F238E27FC236}">
-                  <a16:creationId xmlns:a16="http://schemas.microsoft.com/office/drawing/2014/main" id="{9EFD3CDE-C5A9-A5CC-6A9A-FC357BFEBD00}"/>
+                  <a16:creationId xmlns:a16="http://schemas.microsoft.com/office/drawing/2014/main" id="{3231A0E5-3690-553A-4525-509C39E65044}"/>
                 </a:ext>
               </a:extLst>
             </p:cNvPr>
-            <p:cNvSpPr/>
+            <p:cNvPicPr>
+              <a:picLocks noChangeAspect="1"/>
+            </p:cNvPicPr>
             <p:nvPr/>
-          </p:nvSpPr>
+          </p:nvPicPr>
+          <p:blipFill rotWithShape="1">
+            <a:blip r:embed="rId3"/>
+            <a:srcRect t="46420" b="37546"/>
+            <a:stretch/>
+          </p:blipFill>
           <p:spPr>
             <a:xfrm>
-              <a:off x="1257131" y="4270375"/>
-              <a:ext cx="1305094" cy="270095"/>
+              <a:off x="6980116" y="3621773"/>
+              <a:ext cx="4070504" cy="333375"/>
             </a:xfrm>
-            <a:prstGeom prst="roundRect">
+            <a:prstGeom prst="rect">
               <a:avLst/>
             </a:prstGeom>
-            <a:noFill/>
-            <a:ln w="28575">
-              <a:solidFill>
-                <a:srgbClr val="FF0000"/>
-              </a:solidFill>
-            </a:ln>
           </p:spPr>
-          <p:style>
-            <a:lnRef idx="2">
-              <a:schemeClr val="accent1">
-                <a:shade val="50000"/>
-              </a:schemeClr>
-            </a:lnRef>
-            <a:fillRef idx="1">
-              <a:schemeClr val="accent1"/>
-            </a:fillRef>
-            <a:effectRef idx="0">
-              <a:schemeClr val="accent1"/>
-            </a:effectRef>
-            <a:fontRef idx="minor">
-              <a:schemeClr val="lt1"/>
-            </a:fontRef>
-          </p:style>
-          <p:txBody>
-            <a:bodyPr rtlCol="0" anchor="ctr"/>
-            <a:lstStyle/>
-            <a:p>
-              <a:pPr algn="ctr"/>
-              <a:endParaRPr lang="en-GB"/>
-            </a:p>
-          </p:txBody>
-        </p:sp>
+        </p:pic>
+        <p:grpSp>
+          <p:nvGrpSpPr>
+            <p:cNvPr id="31" name="Group 30">
+              <a:extLst>
+                <a:ext uri="{FF2B5EF4-FFF2-40B4-BE49-F238E27FC236}">
+                  <a16:creationId xmlns:a16="http://schemas.microsoft.com/office/drawing/2014/main" id="{8322D64A-5989-EE29-3FBA-67712EE2AC27}"/>
+                </a:ext>
+              </a:extLst>
+            </p:cNvPr>
+            <p:cNvGrpSpPr/>
+            <p:nvPr/>
+          </p:nvGrpSpPr>
+          <p:grpSpPr>
+            <a:xfrm>
+              <a:off x="6980116" y="3951132"/>
+              <a:ext cx="3344162" cy="288363"/>
+              <a:chOff x="6934396" y="5747772"/>
+              <a:chExt cx="3344162" cy="288363"/>
+            </a:xfrm>
+          </p:grpSpPr>
+          <p:pic>
+            <p:nvPicPr>
+              <p:cNvPr id="28" name="Picture 27">
+                <a:extLst>
+                  <a:ext uri="{FF2B5EF4-FFF2-40B4-BE49-F238E27FC236}">
+                    <a16:creationId xmlns:a16="http://schemas.microsoft.com/office/drawing/2014/main" id="{FF4F232E-7F2D-DAA4-8D1E-1C99A9488F75}"/>
+                  </a:ext>
+                </a:extLst>
+              </p:cNvPr>
+              <p:cNvPicPr>
+                <a:picLocks noChangeAspect="1"/>
+              </p:cNvPicPr>
+              <p:nvPr/>
+            </p:nvPicPr>
+            <p:blipFill rotWithShape="1">
+              <a:blip r:embed="rId3"/>
+              <a:srcRect t="70809" r="81652" b="15322"/>
+              <a:stretch/>
+            </p:blipFill>
+            <p:spPr>
+              <a:xfrm>
+                <a:off x="6934396" y="5747772"/>
+                <a:ext cx="746838" cy="288363"/>
+              </a:xfrm>
+              <a:prstGeom prst="rect">
+                <a:avLst/>
+              </a:prstGeom>
+            </p:spPr>
+          </p:pic>
+          <p:pic>
+            <p:nvPicPr>
+              <p:cNvPr id="30" name="Picture 29">
+                <a:extLst>
+                  <a:ext uri="{FF2B5EF4-FFF2-40B4-BE49-F238E27FC236}">
+                    <a16:creationId xmlns:a16="http://schemas.microsoft.com/office/drawing/2014/main" id="{569D340C-8D4E-BE6C-08F8-EB47FD208A47}"/>
+                  </a:ext>
+                </a:extLst>
+              </p:cNvPr>
+              <p:cNvPicPr>
+                <a:picLocks noChangeAspect="1"/>
+              </p:cNvPicPr>
+              <p:nvPr/>
+            </p:nvPicPr>
+            <p:blipFill rotWithShape="1">
+              <a:blip r:embed="rId3"/>
+              <a:srcRect l="35688" t="70809" b="15322"/>
+              <a:stretch/>
+            </p:blipFill>
+            <p:spPr>
+              <a:xfrm>
+                <a:off x="7660738" y="5747772"/>
+                <a:ext cx="2617820" cy="288363"/>
+              </a:xfrm>
+              <a:prstGeom prst="rect">
+                <a:avLst/>
+              </a:prstGeom>
+            </p:spPr>
+          </p:pic>
+        </p:grpSp>
+      </p:grpSp>
+      <p:grpSp>
+        <p:nvGrpSpPr>
+          <p:cNvPr id="34" name="Group 33">
+            <a:extLst>
+              <a:ext uri="{FF2B5EF4-FFF2-40B4-BE49-F238E27FC236}">
+                <a16:creationId xmlns:a16="http://schemas.microsoft.com/office/drawing/2014/main" id="{F08503BD-0B75-4C0D-849E-44E81F74DF62}"/>
+              </a:ext>
+            </a:extLst>
+          </p:cNvPr>
+          <p:cNvGrpSpPr/>
+          <p:nvPr/>
+        </p:nvGrpSpPr>
+        <p:grpSpPr>
+          <a:xfrm>
+            <a:off x="6980116" y="5460975"/>
+            <a:ext cx="4070504" cy="836057"/>
+            <a:chOff x="6980116" y="4886451"/>
+            <a:chExt cx="4070504" cy="836057"/>
+          </a:xfrm>
+        </p:grpSpPr>
+        <p:pic>
+          <p:nvPicPr>
+            <p:cNvPr id="21" name="Picture 20">
+              <a:extLst>
+                <a:ext uri="{FF2B5EF4-FFF2-40B4-BE49-F238E27FC236}">
+                  <a16:creationId xmlns:a16="http://schemas.microsoft.com/office/drawing/2014/main" id="{D0A77FBE-2626-349D-603B-86B4E51588EF}"/>
+                </a:ext>
+              </a:extLst>
+            </p:cNvPr>
+            <p:cNvPicPr>
+              <a:picLocks noChangeAspect="1"/>
+            </p:cNvPicPr>
+            <p:nvPr/>
+          </p:nvPicPr>
+          <p:blipFill rotWithShape="1">
+            <a:blip r:embed="rId3"/>
+            <a:srcRect b="86131"/>
+            <a:stretch/>
+          </p:blipFill>
+          <p:spPr>
+            <a:xfrm>
+              <a:off x="6980116" y="4886451"/>
+              <a:ext cx="4070504" cy="288363"/>
+            </a:xfrm>
+            <a:prstGeom prst="rect">
+              <a:avLst/>
+            </a:prstGeom>
+          </p:spPr>
+        </p:pic>
+        <p:pic>
+          <p:nvPicPr>
+            <p:cNvPr id="33" name="Picture 32">
+              <a:extLst>
+                <a:ext uri="{FF2B5EF4-FFF2-40B4-BE49-F238E27FC236}">
+                  <a16:creationId xmlns:a16="http://schemas.microsoft.com/office/drawing/2014/main" id="{E7E65139-F708-87DA-1760-549BBE613B05}"/>
+                </a:ext>
+              </a:extLst>
+            </p:cNvPr>
+            <p:cNvPicPr>
+              <a:picLocks noChangeAspect="1"/>
+            </p:cNvPicPr>
+            <p:nvPr/>
+          </p:nvPicPr>
+          <p:blipFill rotWithShape="1">
+            <a:blip r:embed="rId3"/>
+            <a:srcRect t="69624" b="3841"/>
+            <a:stretch/>
+          </p:blipFill>
+          <p:spPr>
+            <a:xfrm>
+              <a:off x="6980116" y="5170798"/>
+              <a:ext cx="4070504" cy="551710"/>
+            </a:xfrm>
+            <a:prstGeom prst="rect">
+              <a:avLst/>
+            </a:prstGeom>
+          </p:spPr>
+        </p:pic>
       </p:grpSp>
     </p:spTree>
     <p:extLst>
@@ -14638,7 +14773,7 @@
                             </p:stCondLst>
                             <p:childTnLst>
                               <p:par>
-                                <p:cTn id="47" presetID="10" presetClass="entr" presetSubtype="0" fill="hold" nodeType="clickEffect">
+                                <p:cTn id="47" presetID="1" presetClass="entr" presetSubtype="0" fill="hold" nodeType="clickEffect">
                                   <p:stCondLst>
                                     <p:cond delay="0"/>
                                   </p:stCondLst>
@@ -14651,7 +14786,7 @@
                                           </p:stCondLst>
                                         </p:cTn>
                                         <p:tgtEl>
-                                          <p:spTgt spid="10"/>
+                                          <p:spTgt spid="35"/>
                                         </p:tgtEl>
                                         <p:attrNameLst>
                                           <p:attrName>style.visibility</p:attrName>
@@ -14661,14 +14796,51 @@
                                         <p:strVal val="visible"/>
                                       </p:to>
                                     </p:set>
-                                    <p:animEffect transition="in" filter="fade">
+                                  </p:childTnLst>
+                                </p:cTn>
+                              </p:par>
+                            </p:childTnLst>
+                          </p:cTn>
+                        </p:par>
+                      </p:childTnLst>
+                    </p:cTn>
+                  </p:par>
+                  <p:par>
+                    <p:cTn id="49" fill="hold">
+                      <p:stCondLst>
+                        <p:cond delay="indefinite"/>
+                      </p:stCondLst>
+                      <p:childTnLst>
+                        <p:par>
+                          <p:cTn id="50" fill="hold">
+                            <p:stCondLst>
+                              <p:cond delay="0"/>
+                            </p:stCondLst>
+                            <p:childTnLst>
+                              <p:par>
+                                <p:cTn id="51" presetID="1" presetClass="entr" presetSubtype="0" fill="hold" nodeType="clickEffect">
+                                  <p:stCondLst>
+                                    <p:cond delay="0"/>
+                                  </p:stCondLst>
+                                  <p:childTnLst>
+                                    <p:set>
                                       <p:cBhvr>
-                                        <p:cTn id="49" dur="500"/>
+                                        <p:cTn id="52" dur="1" fill="hold">
+                                          <p:stCondLst>
+                                            <p:cond delay="0"/>
+                                          </p:stCondLst>
+                                        </p:cTn>
                                         <p:tgtEl>
-                                          <p:spTgt spid="10"/>
+                                          <p:spTgt spid="34"/>
                                         </p:tgtEl>
+                                        <p:attrNameLst>
+                                          <p:attrName>style.visibility</p:attrName>
+                                        </p:attrNameLst>
                                       </p:cBhvr>
-                                    </p:animEffect>
+                                      <p:to>
+                                        <p:strVal val="visible"/>
+                                      </p:to>
+                                    </p:set>
                                   </p:childTnLst>
                                 </p:cTn>
                               </p:par>
@@ -14841,8 +15013,8 @@
         </p:nvSpPr>
         <p:spPr>
           <a:xfrm>
-            <a:off x="4513396" y="6420309"/>
-            <a:ext cx="3017520" cy="369332"/>
+            <a:off x="4621438" y="6417374"/>
+            <a:ext cx="3629844" cy="369332"/>
           </a:xfrm>
           <a:prstGeom prst="rect">
             <a:avLst/>
@@ -14857,7 +15029,7 @@
           <a:p>
             <a:r>
               <a:rPr lang="en-GB" b="1" dirty="0"/>
-              <a:t>~7 times faster****</a:t>
+              <a:t>~7 times faster in Julia****</a:t>
             </a:r>
           </a:p>
         </p:txBody>
@@ -14883,8 +15055,8 @@
         </p:blipFill>
         <p:spPr>
           <a:xfrm>
-            <a:off x="6750173" y="3042920"/>
-            <a:ext cx="3855720" cy="1955800"/>
+            <a:off x="6582284" y="2800533"/>
+            <a:ext cx="4473776" cy="2269307"/>
           </a:xfrm>
           <a:prstGeom prst="rect">
             <a:avLst/>
@@ -14905,8 +15077,8 @@
         </p:nvGrpSpPr>
         <p:grpSpPr>
           <a:xfrm>
-            <a:off x="6617844" y="5278449"/>
-            <a:ext cx="4849492" cy="335150"/>
+            <a:off x="6645020" y="5979409"/>
+            <a:ext cx="4906900" cy="339118"/>
             <a:chOff x="6617844" y="5278449"/>
             <a:chExt cx="4849492" cy="335150"/>
           </a:xfrm>
@@ -16498,9 +16670,9 @@
         <p:grpSpPr>
           <a:xfrm>
             <a:off x="8209280" y="4140200"/>
-            <a:ext cx="1523998" cy="472440"/>
+            <a:ext cx="1778000" cy="472440"/>
             <a:chOff x="8209280" y="4140200"/>
-            <a:chExt cx="1523998" cy="472440"/>
+            <a:chExt cx="1778000" cy="472440"/>
           </a:xfrm>
         </p:grpSpPr>
         <p:cxnSp>
@@ -16561,7 +16733,7 @@
           <p:spPr>
             <a:xfrm>
               <a:off x="8280399" y="4226560"/>
-              <a:ext cx="1452879" cy="369332"/>
+              <a:ext cx="1706881" cy="369332"/>
             </a:xfrm>
             <a:prstGeom prst="rect">
               <a:avLst/>
@@ -16576,7 +16748,7 @@
             <a:p>
               <a:r>
                 <a:rPr lang="en-GB" dirty="0"/>
-                <a:t>~7x slower</a:t>
+                <a:t>~5.3x slower</a:t>
               </a:r>
             </a:p>
           </p:txBody>

</xml_diff>

<commit_message>
Updated slide with extra graph
</commit_message>
<xml_diff>
--- a/Practical examples of accelerating numerical and ML research.pptx
+++ b/Practical examples of accelerating numerical and ML research.pptx
@@ -127,7 +127,23 @@
       </a:defRPr>
     </a:lvl9pPr>
   </p:defaultTextStyle>
+  <p:extLst>
+    <p:ext uri="{EFAFB233-063F-42B5-8137-9DF3F51BA10A}">
+      <p15:sldGuideLst xmlns:p15="http://schemas.microsoft.com/office/powerpoint/2012/main"/>
+    </p:ext>
+    <p:ext uri="{2D200454-40CA-4A62-9FC3-DE9A4176ACB9}">
+      <p15:notesGuideLst xmlns:p15="http://schemas.microsoft.com/office/powerpoint/2012/main"/>
+    </p:ext>
+  </p:extLst>
 </p:presentation>
+</file>
+
+<file path=ppt/revisionInfo.xml><?xml version="1.0" encoding="utf-8"?>
+<p1510:revInfo xmlns:a="http://schemas.openxmlformats.org/drawingml/2006/main" xmlns:r="http://schemas.openxmlformats.org/officeDocument/2006/relationships" xmlns:p1510="http://schemas.microsoft.com/office/powerpoint/2015/10/main">
+  <p1510:revLst>
+    <p1510:client id="{71B39BCA-F173-4738-92BF-7843DCAEDF30}" v="16" dt="2022-09-07T10:20:26.851"/>
+  </p1510:revLst>
+</p1510:revInfo>
 </file>
 
 <file path=ppt/notesMasters/notesMaster1.xml><?xml version="1.0" encoding="utf-8"?>
@@ -212,7 +228,7 @@
           <a:p>
             <a:fld id="{7EDF99C9-8D42-4C02-BDD0-E43532D6B89F}" type="datetimeFigureOut">
               <a:rPr lang="en-GB" smtClean="0"/>
-              <a:t>06/09/2022</a:t>
+              <a:t>07/09/2022</a:t>
             </a:fld>
             <a:endParaRPr lang="en-GB"/>
           </a:p>
@@ -931,7 +947,7 @@
           <a:p>
             <a:fld id="{92538219-6E45-4D12-B767-46F92D5844D4}" type="datetime1">
               <a:rPr lang="en-US" smtClean="0"/>
-              <a:t>9/6/2022</a:t>
+              <a:t>9/7/2022</a:t>
             </a:fld>
             <a:endParaRPr lang="en-US"/>
           </a:p>
@@ -1129,7 +1145,7 @@
           <a:p>
             <a:fld id="{836430B8-6059-41E5-A5DC-C07A76F5859A}" type="datetime1">
               <a:rPr lang="en-US" smtClean="0"/>
-              <a:t>9/6/2022</a:t>
+              <a:t>9/7/2022</a:t>
             </a:fld>
             <a:endParaRPr lang="en-US"/>
           </a:p>
@@ -1391,7 +1407,7 @@
           <a:p>
             <a:fld id="{A09D0CB7-D16E-4358-B7F4-EA4A24554592}" type="datetime1">
               <a:rPr lang="en-US" smtClean="0"/>
-              <a:t>9/6/2022</a:t>
+              <a:t>9/7/2022</a:t>
             </a:fld>
             <a:endParaRPr lang="en-US"/>
           </a:p>
@@ -1607,7 +1623,7 @@
           <a:p>
             <a:fld id="{8BB296A2-D8F0-4E17-BFD0-A6C902250D59}" type="datetime1">
               <a:rPr lang="en-US" smtClean="0"/>
-              <a:t>9/6/2022</a:t>
+              <a:t>9/7/2022</a:t>
             </a:fld>
             <a:endParaRPr lang="en-US"/>
           </a:p>
@@ -1937,7 +1953,7 @@
           <a:p>
             <a:fld id="{D9108C9C-1ACB-4C84-A002-C7E0E45B937A}" type="datetime1">
               <a:rPr lang="en-US" smtClean="0"/>
-              <a:t>9/6/2022</a:t>
+              <a:t>9/7/2022</a:t>
             </a:fld>
             <a:endParaRPr lang="en-US"/>
           </a:p>
@@ -2210,7 +2226,7 @@
           <a:p>
             <a:fld id="{F49AF2A5-B297-4977-9E5B-4D3050E23689}" type="datetime1">
               <a:rPr lang="en-US" smtClean="0"/>
-              <a:t>9/6/2022</a:t>
+              <a:t>9/7/2022</a:t>
             </a:fld>
             <a:endParaRPr lang="en-US"/>
           </a:p>
@@ -2625,7 +2641,7 @@
           <a:p>
             <a:fld id="{70127434-4794-409A-9547-04789BA47588}" type="datetime1">
               <a:rPr lang="en-US" smtClean="0"/>
-              <a:t>9/6/2022</a:t>
+              <a:t>9/7/2022</a:t>
             </a:fld>
             <a:endParaRPr lang="en-US"/>
           </a:p>
@@ -2766,7 +2782,7 @@
           <a:p>
             <a:fld id="{85658635-357A-4E3D-B824-A5CEFDB8449C}" type="datetime1">
               <a:rPr lang="en-US" smtClean="0"/>
-              <a:t>9/6/2022</a:t>
+              <a:t>9/7/2022</a:t>
             </a:fld>
             <a:endParaRPr lang="en-US"/>
           </a:p>
@@ -2879,7 +2895,7 @@
           <a:p>
             <a:fld id="{7E86FF77-2719-4AD0-8740-0B90FF5D1EFB}" type="datetime1">
               <a:rPr lang="en-US" smtClean="0"/>
-              <a:t>9/6/2022</a:t>
+              <a:t>9/7/2022</a:t>
             </a:fld>
             <a:endParaRPr lang="en-US"/>
           </a:p>
@@ -3375,7 +3391,7 @@
           <a:p>
             <a:fld id="{6E441C83-1089-48B9-8B65-293D4C236D35}" type="datetime1">
               <a:rPr lang="en-US" smtClean="0"/>
-              <a:t>9/6/2022</a:t>
+              <a:t>9/7/2022</a:t>
             </a:fld>
             <a:endParaRPr lang="en-US"/>
           </a:p>
@@ -3851,7 +3867,7 @@
           <a:p>
             <a:fld id="{D162FE45-CC1E-47DB-8B82-6CF0636FBDB8}" type="datetime1">
               <a:rPr lang="en-US" smtClean="0"/>
-              <a:t>9/6/2022</a:t>
+              <a:t>9/7/2022</a:t>
             </a:fld>
             <a:endParaRPr lang="en-US"/>
           </a:p>
@@ -4146,7 +4162,7 @@
           <a:p>
             <a:fld id="{51FC8E16-3C03-4238-9C6F-B34F3D10F77E}" type="datetime1">
               <a:rPr lang="en-US" smtClean="0"/>
-              <a:t>9/6/2022</a:t>
+              <a:t>9/7/2022</a:t>
             </a:fld>
             <a:endParaRPr lang="en-US" dirty="0"/>
           </a:p>
@@ -5573,8 +5589,8 @@
           </a:p>
         </p:txBody>
       </p:sp>
-      <mc:AlternateContent xmlns:mc="http://schemas.openxmlformats.org/markup-compatibility/2006">
-        <mc:Choice xmlns:a14="http://schemas.microsoft.com/office/drawing/2010/main" Requires="a14">
+      <mc:AlternateContent xmlns:mc="http://schemas.openxmlformats.org/markup-compatibility/2006" xmlns:a14="http://schemas.microsoft.com/office/drawing/2010/main">
+        <mc:Choice Requires="a14">
           <p:sp>
             <p:nvSpPr>
               <p:cNvPr id="8" name="TextBox 7">
@@ -5669,7 +5685,7 @@
             </p:txBody>
           </p:sp>
         </mc:Choice>
-        <mc:Fallback>
+        <mc:Fallback xmlns="">
           <p:sp>
             <p:nvSpPr>
               <p:cNvPr id="8" name="TextBox 7">
@@ -5759,13 +5775,13 @@
   <p:clrMapOvr>
     <a:masterClrMapping/>
   </p:clrMapOvr>
-  <mc:AlternateContent xmlns:mc="http://schemas.openxmlformats.org/markup-compatibility/2006">
-    <mc:Choice xmlns:p14="http://schemas.microsoft.com/office/powerpoint/2010/main" Requires="p14">
+  <mc:AlternateContent xmlns:mc="http://schemas.openxmlformats.org/markup-compatibility/2006" xmlns:p14="http://schemas.microsoft.com/office/powerpoint/2010/main">
+    <mc:Choice Requires="p14">
       <p:transition p14:dur="250">
         <p:fade/>
       </p:transition>
     </mc:Choice>
-    <mc:Fallback>
+    <mc:Fallback xmlns="">
       <p:transition>
         <p:fade/>
       </p:transition>
@@ -6175,8 +6191,8 @@
             </p:txBody>
           </p:sp>
         </p:grpSp>
-        <mc:AlternateContent xmlns:mc="http://schemas.openxmlformats.org/markup-compatibility/2006">
-          <mc:Choice xmlns:a14="http://schemas.microsoft.com/office/drawing/2010/main" Requires="a14">
+        <mc:AlternateContent xmlns:mc="http://schemas.openxmlformats.org/markup-compatibility/2006" xmlns:a14="http://schemas.microsoft.com/office/drawing/2010/main">
+          <mc:Choice Requires="a14">
             <p:sp>
               <p:nvSpPr>
                 <p:cNvPr id="12" name="TextBox 11">
@@ -6205,6 +6221,7 @@
                 </a:bodyPr>
                 <a:lstStyle/>
                 <a:p>
+                  <a:pPr/>
                   <a14:m>
                     <m:oMathPara xmlns:m="http://schemas.openxmlformats.org/officeDocument/2006/math">
                       <m:oMathParaPr>
@@ -6226,7 +6243,7 @@
               </p:txBody>
             </p:sp>
           </mc:Choice>
-          <mc:Fallback>
+          <mc:Fallback xmlns="">
             <p:sp>
               <p:nvSpPr>
                 <p:cNvPr id="12" name="TextBox 11">
@@ -6466,8 +6483,8 @@
             </a:p>
           </p:txBody>
         </p:sp>
-        <mc:AlternateContent xmlns:mc="http://schemas.openxmlformats.org/markup-compatibility/2006">
-          <mc:Choice xmlns:a14="http://schemas.microsoft.com/office/drawing/2010/main" Requires="a14">
+        <mc:AlternateContent xmlns:mc="http://schemas.openxmlformats.org/markup-compatibility/2006" xmlns:a14="http://schemas.microsoft.com/office/drawing/2010/main">
+          <mc:Choice Requires="a14">
             <p:sp>
               <p:nvSpPr>
                 <p:cNvPr id="20" name="TextBox 19">
@@ -6534,7 +6551,7 @@
               </p:txBody>
             </p:sp>
           </mc:Choice>
-          <mc:Fallback>
+          <mc:Fallback xmlns="">
             <p:sp>
               <p:nvSpPr>
                 <p:cNvPr id="20" name="TextBox 19">
@@ -9866,8 +9883,8 @@
             </p:txBody>
           </p:sp>
         </p:grpSp>
-        <mc:AlternateContent xmlns:mc="http://schemas.openxmlformats.org/markup-compatibility/2006">
-          <mc:Choice xmlns:a14="http://schemas.microsoft.com/office/drawing/2010/main" Requires="a14">
+        <mc:AlternateContent xmlns:mc="http://schemas.openxmlformats.org/markup-compatibility/2006" xmlns:a14="http://schemas.microsoft.com/office/drawing/2010/main">
+          <mc:Choice Requires="a14">
             <p:sp>
               <p:nvSpPr>
                 <p:cNvPr id="34" name="TextBox 33">
@@ -9896,6 +9913,7 @@
                 </a:bodyPr>
                 <a:lstStyle/>
                 <a:p>
+                  <a:pPr/>
                   <a14:m>
                     <m:oMathPara xmlns:m="http://schemas.openxmlformats.org/officeDocument/2006/math">
                       <m:oMathParaPr>
@@ -9917,7 +9935,7 @@
               </p:txBody>
             </p:sp>
           </mc:Choice>
-          <mc:Fallback>
+          <mc:Fallback xmlns="">
             <p:sp>
               <p:nvSpPr>
                 <p:cNvPr id="34" name="TextBox 33">
@@ -10157,8 +10175,8 @@
             </a:p>
           </p:txBody>
         </p:sp>
-        <mc:AlternateContent xmlns:mc="http://schemas.openxmlformats.org/markup-compatibility/2006">
-          <mc:Choice xmlns:a14="http://schemas.microsoft.com/office/drawing/2010/main" Requires="a14">
+        <mc:AlternateContent xmlns:mc="http://schemas.openxmlformats.org/markup-compatibility/2006" xmlns:a14="http://schemas.microsoft.com/office/drawing/2010/main">
+          <mc:Choice Requires="a14">
             <p:sp>
               <p:nvSpPr>
                 <p:cNvPr id="41" name="TextBox 40">
@@ -10225,7 +10243,7 @@
               </p:txBody>
             </p:sp>
           </mc:Choice>
-          <mc:Fallback>
+          <mc:Fallback xmlns="">
             <p:sp>
               <p:nvSpPr>
                 <p:cNvPr id="41" name="TextBox 40">
@@ -12988,8 +13006,8 @@
           </a:p>
         </p:txBody>
       </p:sp>
-      <mc:AlternateContent xmlns:mc="http://schemas.openxmlformats.org/markup-compatibility/2006">
-        <mc:Choice xmlns:a14="http://schemas.microsoft.com/office/drawing/2010/main" Requires="a14">
+      <mc:AlternateContent xmlns:mc="http://schemas.openxmlformats.org/markup-compatibility/2006" xmlns:a14="http://schemas.microsoft.com/office/drawing/2010/main">
+        <mc:Choice Requires="a14">
           <p:sp>
             <p:nvSpPr>
               <p:cNvPr id="9" name="Content Placeholder 8">
@@ -13079,7 +13097,7 @@
             </p:txBody>
           </p:sp>
         </mc:Choice>
-        <mc:Fallback>
+        <mc:Fallback xmlns="">
           <p:sp>
             <p:nvSpPr>
               <p:cNvPr id="9" name="Content Placeholder 8">
@@ -13348,6 +13366,36 @@
           </p:sp>
         </p:grpSp>
       </p:grpSp>
+      <p:pic>
+        <p:nvPicPr>
+          <p:cNvPr id="4" name="Picture 5" descr="Chart&#10;&#10;Description automatically generated">
+            <a:extLst>
+              <a:ext uri="{FF2B5EF4-FFF2-40B4-BE49-F238E27FC236}">
+                <a16:creationId xmlns:a16="http://schemas.microsoft.com/office/drawing/2014/main" id="{58BA91B5-0BCF-70CB-6A7F-6803DF396CD3}"/>
+              </a:ext>
+            </a:extLst>
+          </p:cNvPr>
+          <p:cNvPicPr>
+            <a:picLocks noChangeAspect="1"/>
+          </p:cNvPicPr>
+          <p:nvPr/>
+        </p:nvPicPr>
+        <p:blipFill>
+          <a:blip r:embed="rId6"/>
+          <a:stretch>
+            <a:fillRect/>
+          </a:stretch>
+        </p:blipFill>
+        <p:spPr>
+          <a:xfrm>
+            <a:off x="6457950" y="190500"/>
+            <a:ext cx="5105400" cy="3400425"/>
+          </a:xfrm>
+          <a:prstGeom prst="rect">
+            <a:avLst/>
+          </a:prstGeom>
+        </p:spPr>
+      </p:pic>
     </p:spTree>
     <p:extLst>
       <p:ext uri="{BB962C8B-B14F-4D97-AF65-F5344CB8AC3E}">
@@ -13506,11 +13554,7 @@
                                           </p:stCondLst>
                                         </p:cTn>
                                         <p:tgtEl>
-                                          <p:spTgt spid="9">
-                                            <p:txEl>
-                                              <p:pRg st="1" end="1"/>
-                                            </p:txEl>
-                                          </p:spTgt>
+                                          <p:spTgt spid="4"/>
                                         </p:tgtEl>
                                         <p:attrNameLst>
                                           <p:attrName>style.visibility</p:attrName>
@@ -13524,11 +13568,7 @@
                                       <p:cBhvr>
                                         <p:cTn id="17" dur="500"/>
                                         <p:tgtEl>
-                                          <p:spTgt spid="9">
-                                            <p:txEl>
-                                              <p:pRg st="1" end="1"/>
-                                            </p:txEl>
-                                          </p:spTgt>
+                                          <p:spTgt spid="4"/>
                                         </p:tgtEl>
                                       </p:cBhvr>
                                     </p:animEffect>
@@ -13567,7 +13607,11 @@
                                           </p:stCondLst>
                                         </p:cTn>
                                         <p:tgtEl>
-                                          <p:spTgt spid="7"/>
+                                          <p:spTgt spid="9">
+                                            <p:txEl>
+                                              <p:pRg st="1" end="1"/>
+                                            </p:txEl>
+                                          </p:spTgt>
                                         </p:tgtEl>
                                         <p:attrNameLst>
                                           <p:attrName>style.visibility</p:attrName>
@@ -13581,7 +13625,11 @@
                                       <p:cBhvr>
                                         <p:cTn id="22" dur="500"/>
                                         <p:tgtEl>
-                                          <p:spTgt spid="7"/>
+                                          <p:spTgt spid="9">
+                                            <p:txEl>
+                                              <p:pRg st="1" end="1"/>
+                                            </p:txEl>
+                                          </p:spTgt>
                                         </p:tgtEl>
                                       </p:cBhvr>
                                     </p:animEffect>
@@ -13620,11 +13668,7 @@
                                           </p:stCondLst>
                                         </p:cTn>
                                         <p:tgtEl>
-                                          <p:spTgt spid="9">
-                                            <p:txEl>
-                                              <p:pRg st="2" end="2"/>
-                                            </p:txEl>
-                                          </p:spTgt>
+                                          <p:spTgt spid="7"/>
                                         </p:tgtEl>
                                         <p:attrNameLst>
                                           <p:attrName>style.visibility</p:attrName>
@@ -13638,11 +13682,7 @@
                                       <p:cBhvr>
                                         <p:cTn id="27" dur="500"/>
                                         <p:tgtEl>
-                                          <p:spTgt spid="9">
-                                            <p:txEl>
-                                              <p:pRg st="2" end="2"/>
-                                            </p:txEl>
-                                          </p:spTgt>
+                                          <p:spTgt spid="7"/>
                                         </p:tgtEl>
                                       </p:cBhvr>
                                     </p:animEffect>
@@ -13668,14 +13708,75 @@
                             </p:stCondLst>
                             <p:childTnLst>
                               <p:par>
-                                <p:cTn id="30" presetID="10" presetClass="exit" presetSubtype="0" fill="hold" nodeType="clickEffect">
+                                <p:cTn id="30" presetID="10" presetClass="entr" presetSubtype="0" fill="hold" nodeType="clickEffect">
+                                  <p:stCondLst>
+                                    <p:cond delay="0"/>
+                                  </p:stCondLst>
+                                  <p:childTnLst>
+                                    <p:set>
+                                      <p:cBhvr>
+                                        <p:cTn id="31" dur="1" fill="hold">
+                                          <p:stCondLst>
+                                            <p:cond delay="0"/>
+                                          </p:stCondLst>
+                                        </p:cTn>
+                                        <p:tgtEl>
+                                          <p:spTgt spid="9">
+                                            <p:txEl>
+                                              <p:pRg st="2" end="2"/>
+                                            </p:txEl>
+                                          </p:spTgt>
+                                        </p:tgtEl>
+                                        <p:attrNameLst>
+                                          <p:attrName>style.visibility</p:attrName>
+                                        </p:attrNameLst>
+                                      </p:cBhvr>
+                                      <p:to>
+                                        <p:strVal val="visible"/>
+                                      </p:to>
+                                    </p:set>
+                                    <p:animEffect transition="in" filter="fade">
+                                      <p:cBhvr>
+                                        <p:cTn id="32" dur="500"/>
+                                        <p:tgtEl>
+                                          <p:spTgt spid="9">
+                                            <p:txEl>
+                                              <p:pRg st="2" end="2"/>
+                                            </p:txEl>
+                                          </p:spTgt>
+                                        </p:tgtEl>
+                                      </p:cBhvr>
+                                    </p:animEffect>
+                                  </p:childTnLst>
+                                </p:cTn>
+                              </p:par>
+                            </p:childTnLst>
+                          </p:cTn>
+                        </p:par>
+                      </p:childTnLst>
+                    </p:cTn>
+                  </p:par>
+                  <p:par>
+                    <p:cTn id="33" fill="hold">
+                      <p:stCondLst>
+                        <p:cond delay="indefinite"/>
+                      </p:stCondLst>
+                      <p:childTnLst>
+                        <p:par>
+                          <p:cTn id="34" fill="hold">
+                            <p:stCondLst>
+                              <p:cond delay="0"/>
+                            </p:stCondLst>
+                            <p:childTnLst>
+                              <p:par>
+                                <p:cTn id="35" presetID="10" presetClass="exit" presetSubtype="0" fill="hold" nodeType="clickEffect">
                                   <p:stCondLst>
                                     <p:cond delay="0"/>
                                   </p:stCondLst>
                                   <p:childTnLst>
                                     <p:animEffect transition="out" filter="fade">
                                       <p:cBhvr>
-                                        <p:cTn id="31" dur="250"/>
+                                        <p:cTn id="36" dur="250"/>
                                         <p:tgtEl>
                                           <p:spTgt spid="7"/>
                                         </p:tgtEl>
@@ -13683,7 +13784,7 @@
                                     </p:animEffect>
                                     <p:set>
                                       <p:cBhvr>
-                                        <p:cTn id="32" dur="1" fill="hold">
+                                        <p:cTn id="37" dur="1" fill="hold">
                                           <p:stCondLst>
                                             <p:cond delay="249"/>
                                           </p:stCondLst>
@@ -13706,20 +13807,20 @@
                           </p:cTn>
                         </p:par>
                         <p:par>
-                          <p:cTn id="33" fill="hold">
+                          <p:cTn id="38" fill="hold">
                             <p:stCondLst>
                               <p:cond delay="250"/>
                             </p:stCondLst>
                             <p:childTnLst>
                               <p:par>
-                                <p:cTn id="34" presetID="10" presetClass="entr" presetSubtype="0" fill="hold" nodeType="afterEffect">
+                                <p:cTn id="39" presetID="10" presetClass="entr" presetSubtype="0" fill="hold" nodeType="afterEffect">
                                   <p:stCondLst>
                                     <p:cond delay="0"/>
                                   </p:stCondLst>
                                   <p:childTnLst>
                                     <p:set>
                                       <p:cBhvr>
-                                        <p:cTn id="35" dur="1" fill="hold">
+                                        <p:cTn id="40" dur="1" fill="hold">
                                           <p:stCondLst>
                                             <p:cond delay="0"/>
                                           </p:stCondLst>
@@ -13737,7 +13838,7 @@
                                     </p:set>
                                     <p:animEffect transition="in" filter="fade">
                                       <p:cBhvr>
-                                        <p:cTn id="36" dur="250"/>
+                                        <p:cTn id="41" dur="250"/>
                                         <p:tgtEl>
                                           <p:spTgt spid="19"/>
                                         </p:tgtEl>
@@ -16005,8 +16106,8 @@
             </p:txBody>
           </p:sp>
         </p:grpSp>
-        <mc:AlternateContent xmlns:mc="http://schemas.openxmlformats.org/markup-compatibility/2006">
-          <mc:Choice xmlns:a14="http://schemas.microsoft.com/office/drawing/2010/main" Requires="a14">
+        <mc:AlternateContent xmlns:mc="http://schemas.openxmlformats.org/markup-compatibility/2006" xmlns:a14="http://schemas.microsoft.com/office/drawing/2010/main">
+          <mc:Choice Requires="a14">
             <p:sp>
               <p:nvSpPr>
                 <p:cNvPr id="9" name="TextBox 8">
@@ -16035,6 +16136,7 @@
                 </a:bodyPr>
                 <a:lstStyle/>
                 <a:p>
+                  <a:pPr/>
                   <a14:m>
                     <m:oMathPara xmlns:m="http://schemas.openxmlformats.org/officeDocument/2006/math">
                       <m:oMathParaPr>
@@ -16056,7 +16158,7 @@
               </p:txBody>
             </p:sp>
           </mc:Choice>
-          <mc:Fallback>
+          <mc:Fallback xmlns="">
             <p:sp>
               <p:nvSpPr>
                 <p:cNvPr id="9" name="TextBox 8">
@@ -16764,13 +16866,13 @@
   <p:clrMapOvr>
     <a:masterClrMapping/>
   </p:clrMapOvr>
-  <mc:AlternateContent xmlns:mc="http://schemas.openxmlformats.org/markup-compatibility/2006">
-    <mc:Choice xmlns:p14="http://schemas.microsoft.com/office/powerpoint/2010/main" Requires="p14">
+  <mc:AlternateContent xmlns:mc="http://schemas.openxmlformats.org/markup-compatibility/2006" xmlns:p14="http://schemas.microsoft.com/office/powerpoint/2010/main">
+    <mc:Choice Requires="p14">
       <p:transition p14:dur="250">
         <p:fade/>
       </p:transition>
     </mc:Choice>
-    <mc:Fallback>
+    <mc:Fallback xmlns="">
       <p:transition>
         <p:fade/>
       </p:transition>

</xml_diff>